<commit_message>
additional cleanup of figures, text
updated 2 figures, several pieces of text
</commit_message>
<xml_diff>
--- a/imgs/Sunfish_doc_drawings_src_041824.pptx
+++ b/imgs/Sunfish_doc_drawings_src_041824.pptx
@@ -939,7 +939,7 @@
           <a:p>
             <a:fld id="{946DE024-6CCD-4091-8D24-2C3D872B51B0}" type="datetimeFigureOut">
               <a:rPr lang="en-GB" smtClean="0"/>
-              <a:t>18/04/2024</a:t>
+              <a:t>27/04/2025</a:t>
             </a:fld>
             <a:endParaRPr lang="en-GB"/>
           </a:p>
@@ -2950,7 +2950,7 @@
           <a:p>
             <a:fld id="{1F602796-A358-4C4F-B1CA-D5A4F00CA98F}" type="datetimeFigureOut">
               <a:rPr lang="en-GB" smtClean="0"/>
-              <a:t>18/04/2024</a:t>
+              <a:t>27/04/2025</a:t>
             </a:fld>
             <a:endParaRPr lang="en-GB"/>
           </a:p>
@@ -3150,7 +3150,7 @@
           <a:p>
             <a:fld id="{1F602796-A358-4C4F-B1CA-D5A4F00CA98F}" type="datetimeFigureOut">
               <a:rPr lang="en-GB" smtClean="0"/>
-              <a:t>18/04/2024</a:t>
+              <a:t>27/04/2025</a:t>
             </a:fld>
             <a:endParaRPr lang="en-GB"/>
           </a:p>
@@ -3360,7 +3360,7 @@
           <a:p>
             <a:fld id="{1F602796-A358-4C4F-B1CA-D5A4F00CA98F}" type="datetimeFigureOut">
               <a:rPr lang="en-GB" smtClean="0"/>
-              <a:t>18/04/2024</a:t>
+              <a:t>27/04/2025</a:t>
             </a:fld>
             <a:endParaRPr lang="en-GB"/>
           </a:p>
@@ -3983,7 +3983,7 @@
           <a:p>
             <a:fld id="{F223B104-6C48-47CE-89AF-4D364C36C5DB}" type="datetimeFigureOut">
               <a:rPr lang="en-GB" smtClean="0"/>
-              <a:t>18/04/2024</a:t>
+              <a:t>27/04/2025</a:t>
             </a:fld>
             <a:endParaRPr lang="en-GB"/>
           </a:p>
@@ -4183,7 +4183,7 @@
           <a:p>
             <a:fld id="{F223B104-6C48-47CE-89AF-4D364C36C5DB}" type="datetimeFigureOut">
               <a:rPr lang="en-GB" smtClean="0"/>
-              <a:t>18/04/2024</a:t>
+              <a:t>27/04/2025</a:t>
             </a:fld>
             <a:endParaRPr lang="en-GB"/>
           </a:p>
@@ -4459,7 +4459,7 @@
           <a:p>
             <a:fld id="{F223B104-6C48-47CE-89AF-4D364C36C5DB}" type="datetimeFigureOut">
               <a:rPr lang="en-GB" smtClean="0"/>
-              <a:t>18/04/2024</a:t>
+              <a:t>27/04/2025</a:t>
             </a:fld>
             <a:endParaRPr lang="en-GB"/>
           </a:p>
@@ -4727,7 +4727,7 @@
           <a:p>
             <a:fld id="{F223B104-6C48-47CE-89AF-4D364C36C5DB}" type="datetimeFigureOut">
               <a:rPr lang="en-GB" smtClean="0"/>
-              <a:t>18/04/2024</a:t>
+              <a:t>27/04/2025</a:t>
             </a:fld>
             <a:endParaRPr lang="en-GB"/>
           </a:p>
@@ -5142,7 +5142,7 @@
           <a:p>
             <a:fld id="{F223B104-6C48-47CE-89AF-4D364C36C5DB}" type="datetimeFigureOut">
               <a:rPr lang="en-GB" smtClean="0"/>
-              <a:t>18/04/2024</a:t>
+              <a:t>27/04/2025</a:t>
             </a:fld>
             <a:endParaRPr lang="en-GB"/>
           </a:p>
@@ -5284,7 +5284,7 @@
           <a:p>
             <a:fld id="{F223B104-6C48-47CE-89AF-4D364C36C5DB}" type="datetimeFigureOut">
               <a:rPr lang="en-GB" smtClean="0"/>
-              <a:t>18/04/2024</a:t>
+              <a:t>27/04/2025</a:t>
             </a:fld>
             <a:endParaRPr lang="en-GB"/>
           </a:p>
@@ -5397,7 +5397,7 @@
           <a:p>
             <a:fld id="{F223B104-6C48-47CE-89AF-4D364C36C5DB}" type="datetimeFigureOut">
               <a:rPr lang="en-GB" smtClean="0"/>
-              <a:t>18/04/2024</a:t>
+              <a:t>27/04/2025</a:t>
             </a:fld>
             <a:endParaRPr lang="en-GB"/>
           </a:p>
@@ -5597,7 +5597,7 @@
           <a:p>
             <a:fld id="{1F602796-A358-4C4F-B1CA-D5A4F00CA98F}" type="datetimeFigureOut">
               <a:rPr lang="en-GB" smtClean="0"/>
-              <a:t>18/04/2024</a:t>
+              <a:t>27/04/2025</a:t>
             </a:fld>
             <a:endParaRPr lang="en-GB"/>
           </a:p>
@@ -5910,7 +5910,7 @@
           <a:p>
             <a:fld id="{F223B104-6C48-47CE-89AF-4D364C36C5DB}" type="datetimeFigureOut">
               <a:rPr lang="en-GB" smtClean="0"/>
-              <a:t>18/04/2024</a:t>
+              <a:t>27/04/2025</a:t>
             </a:fld>
             <a:endParaRPr lang="en-GB"/>
           </a:p>
@@ -6199,7 +6199,7 @@
           <a:p>
             <a:fld id="{F223B104-6C48-47CE-89AF-4D364C36C5DB}" type="datetimeFigureOut">
               <a:rPr lang="en-GB" smtClean="0"/>
-              <a:t>18/04/2024</a:t>
+              <a:t>27/04/2025</a:t>
             </a:fld>
             <a:endParaRPr lang="en-GB"/>
           </a:p>
@@ -6399,7 +6399,7 @@
           <a:p>
             <a:fld id="{F223B104-6C48-47CE-89AF-4D364C36C5DB}" type="datetimeFigureOut">
               <a:rPr lang="en-GB" smtClean="0"/>
-              <a:t>18/04/2024</a:t>
+              <a:t>27/04/2025</a:t>
             </a:fld>
             <a:endParaRPr lang="en-GB"/>
           </a:p>
@@ -6609,7 +6609,7 @@
           <a:p>
             <a:fld id="{F223B104-6C48-47CE-89AF-4D364C36C5DB}" type="datetimeFigureOut">
               <a:rPr lang="en-GB" smtClean="0"/>
-              <a:t>18/04/2024</a:t>
+              <a:t>27/04/2025</a:t>
             </a:fld>
             <a:endParaRPr lang="en-GB"/>
           </a:p>
@@ -6885,7 +6885,7 @@
           <a:p>
             <a:fld id="{1F602796-A358-4C4F-B1CA-D5A4F00CA98F}" type="datetimeFigureOut">
               <a:rPr lang="en-GB" smtClean="0"/>
-              <a:t>18/04/2024</a:t>
+              <a:t>27/04/2025</a:t>
             </a:fld>
             <a:endParaRPr lang="en-GB"/>
           </a:p>
@@ -7153,7 +7153,7 @@
           <a:p>
             <a:fld id="{1F602796-A358-4C4F-B1CA-D5A4F00CA98F}" type="datetimeFigureOut">
               <a:rPr lang="en-GB" smtClean="0"/>
-              <a:t>18/04/2024</a:t>
+              <a:t>27/04/2025</a:t>
             </a:fld>
             <a:endParaRPr lang="en-GB"/>
           </a:p>
@@ -7568,7 +7568,7 @@
           <a:p>
             <a:fld id="{1F602796-A358-4C4F-B1CA-D5A4F00CA98F}" type="datetimeFigureOut">
               <a:rPr lang="en-GB" smtClean="0"/>
-              <a:t>18/04/2024</a:t>
+              <a:t>27/04/2025</a:t>
             </a:fld>
             <a:endParaRPr lang="en-GB"/>
           </a:p>
@@ -7710,7 +7710,7 @@
           <a:p>
             <a:fld id="{1F602796-A358-4C4F-B1CA-D5A4F00CA98F}" type="datetimeFigureOut">
               <a:rPr lang="en-GB" smtClean="0"/>
-              <a:t>18/04/2024</a:t>
+              <a:t>27/04/2025</a:t>
             </a:fld>
             <a:endParaRPr lang="en-GB"/>
           </a:p>
@@ -7823,7 +7823,7 @@
           <a:p>
             <a:fld id="{1F602796-A358-4C4F-B1CA-D5A4F00CA98F}" type="datetimeFigureOut">
               <a:rPr lang="en-GB" smtClean="0"/>
-              <a:t>18/04/2024</a:t>
+              <a:t>27/04/2025</a:t>
             </a:fld>
             <a:endParaRPr lang="en-GB"/>
           </a:p>
@@ -8136,7 +8136,7 @@
           <a:p>
             <a:fld id="{1F602796-A358-4C4F-B1CA-D5A4F00CA98F}" type="datetimeFigureOut">
               <a:rPr lang="en-GB" smtClean="0"/>
-              <a:t>18/04/2024</a:t>
+              <a:t>27/04/2025</a:t>
             </a:fld>
             <a:endParaRPr lang="en-GB"/>
           </a:p>
@@ -8425,7 +8425,7 @@
           <a:p>
             <a:fld id="{1F602796-A358-4C4F-B1CA-D5A4F00CA98F}" type="datetimeFigureOut">
               <a:rPr lang="en-GB" smtClean="0"/>
-              <a:t>18/04/2024</a:t>
+              <a:t>27/04/2025</a:t>
             </a:fld>
             <a:endParaRPr lang="en-GB"/>
           </a:p>
@@ -8668,7 +8668,7 @@
           <a:p>
             <a:fld id="{1F602796-A358-4C4F-B1CA-D5A4F00CA98F}" type="datetimeFigureOut">
               <a:rPr lang="en-GB" smtClean="0"/>
-              <a:t>18/04/2024</a:t>
+              <a:t>27/04/2025</a:t>
             </a:fld>
             <a:endParaRPr lang="en-GB"/>
           </a:p>
@@ -9239,7 +9239,7 @@
           <a:p>
             <a:fld id="{F223B104-6C48-47CE-89AF-4D364C36C5DB}" type="datetimeFigureOut">
               <a:rPr lang="en-GB" smtClean="0"/>
-              <a:t>18/04/2024</a:t>
+              <a:t>27/04/2025</a:t>
             </a:fld>
             <a:endParaRPr lang="en-GB"/>
           </a:p>
@@ -24373,50 +24373,6 @@
       </p:sp>
       <p:sp>
         <p:nvSpPr>
-          <p:cNvPr id="2" name="Title 1">
-            <a:extLst>
-              <a:ext uri="{FF2B5EF4-FFF2-40B4-BE49-F238E27FC236}">
-                <a16:creationId xmlns:a16="http://schemas.microsoft.com/office/drawing/2014/main" id="{A21F9BB3-19E8-171D-B527-920B57F51297}"/>
-              </a:ext>
-            </a:extLst>
-          </p:cNvPr>
-          <p:cNvSpPr>
-            <a:spLocks noGrp="1"/>
-          </p:cNvSpPr>
-          <p:nvPr>
-            <p:ph type="title"/>
-          </p:nvPr>
-        </p:nvSpPr>
-        <p:spPr>
-          <a:xfrm>
-            <a:off x="143385" y="132847"/>
-            <a:ext cx="10515600" cy="1325563"/>
-          </a:xfrm>
-        </p:spPr>
-        <p:txBody>
-          <a:bodyPr>
-            <a:normAutofit/>
-          </a:bodyPr>
-          <a:lstStyle/>
-          <a:p>
-            <a:r>
-              <a:rPr lang="en-US" sz="3600" i="1" dirty="0">
-                <a:solidFill>
-                  <a:schemeClr val="bg1"/>
-                </a:solidFill>
-              </a:rPr>
-              <a:t>Resources Involved in Connection</a:t>
-            </a:r>
-            <a:endParaRPr lang="en-GB" sz="3600" dirty="0">
-              <a:solidFill>
-                <a:schemeClr val="bg1"/>
-              </a:solidFill>
-            </a:endParaRPr>
-          </a:p>
-        </p:txBody>
-      </p:sp>
-      <p:sp>
-        <p:nvSpPr>
           <p:cNvPr id="7" name="Oval 6">
             <a:extLst>
               <a:ext uri="{FF2B5EF4-FFF2-40B4-BE49-F238E27FC236}">
@@ -24490,7 +24446,7 @@
                   <a:noFill/>
                 </a:ln>
                 <a:solidFill>
-                  <a:prstClr val="white"/>
+                  <a:schemeClr val="tx1"/>
                 </a:solidFill>
                 <a:effectLst/>
                 <a:uLnTx/>
@@ -24611,8 +24567,8 @@
         </p:nvCxnSpPr>
         <p:spPr>
           <a:xfrm rot="5400000">
-            <a:off x="1860104" y="4247999"/>
-            <a:ext cx="473590" cy="532373"/>
+            <a:off x="1800031" y="4308072"/>
+            <a:ext cx="473590" cy="412227"/>
           </a:xfrm>
           <a:prstGeom prst="curvedConnector3">
             <a:avLst>
@@ -24786,8 +24742,8 @@
         </p:nvSpPr>
         <p:spPr>
           <a:xfrm>
-            <a:off x="1946258" y="3840717"/>
-            <a:ext cx="844510" cy="252421"/>
+            <a:off x="1673320" y="3840717"/>
+            <a:ext cx="1117448" cy="252421"/>
           </a:xfrm>
           <a:prstGeom prst="ellipse">
             <a:avLst/>
@@ -24847,7 +24803,7 @@
                   <a:noFill/>
                 </a:ln>
                 <a:solidFill>
-                  <a:prstClr val="white"/>
+                  <a:schemeClr val="tx1"/>
                 </a:solidFill>
                 <a:effectLst/>
                 <a:uLnTx/>
@@ -24856,7 +24812,7 @@
                 <a:ea typeface="+mn-ea"/>
                 <a:cs typeface="+mn-cs"/>
               </a:rPr>
-              <a:t>CPUs</a:t>
+              <a:t>Processors</a:t>
             </a:r>
           </a:p>
         </p:txBody>
@@ -24875,8 +24831,8 @@
         </p:nvSpPr>
         <p:spPr>
           <a:xfrm>
-            <a:off x="2212316" y="4023890"/>
-            <a:ext cx="301537" cy="253500"/>
+            <a:off x="1972024" y="4023890"/>
+            <a:ext cx="541829" cy="253500"/>
           </a:xfrm>
           <a:prstGeom prst="ellipse">
             <a:avLst/>
@@ -24931,22 +24887,28 @@
               <a:defRPr/>
             </a:pPr>
             <a:r>
-              <a:rPr kumimoji="0" lang="en-GB" sz="700" b="0" i="0" u="none" strike="noStrike" kern="1200" cap="none" spc="0" normalizeH="0" baseline="0" noProof="0" dirty="0">
-                <a:ln>
-                  <a:noFill/>
-                </a:ln>
+              <a:rPr lang="en-GB" sz="700" dirty="0">
                 <a:solidFill>
                   <a:prstClr val="black"/>
                 </a:solidFill>
-                <a:effectLst/>
-                <a:uLnTx/>
-                <a:uFillTx/>
                 <a:latin typeface="Calibri" panose="020F0502020204030204"/>
-                <a:ea typeface="+mn-ea"/>
-                <a:cs typeface="+mn-cs"/>
               </a:rPr>
-              <a:t>1</a:t>
+              <a:t>CPU1</a:t>
             </a:r>
+            <a:endParaRPr kumimoji="0" lang="en-GB" sz="700" b="0" i="0" u="none" strike="noStrike" kern="1200" cap="none" spc="0" normalizeH="0" baseline="0" noProof="0" dirty="0">
+              <a:ln>
+                <a:noFill/>
+              </a:ln>
+              <a:solidFill>
+                <a:prstClr val="black"/>
+              </a:solidFill>
+              <a:effectLst/>
+              <a:uLnTx/>
+              <a:uFillTx/>
+              <a:latin typeface="Calibri" panose="020F0502020204030204"/>
+              <a:ea typeface="+mn-ea"/>
+              <a:cs typeface="+mn-cs"/>
+            </a:endParaRPr>
           </a:p>
         </p:txBody>
       </p:sp>
@@ -24967,9 +24929,9 @@
           <p:nvPr/>
         </p:nvCxnSpPr>
         <p:spPr>
-          <a:xfrm rot="16200000" flipH="1">
-            <a:off x="1899014" y="3371217"/>
-            <a:ext cx="883451" cy="55548"/>
+          <a:xfrm rot="5400000">
+            <a:off x="1830780" y="3358531"/>
+            <a:ext cx="883451" cy="80921"/>
           </a:xfrm>
           <a:prstGeom prst="curvedConnector3">
             <a:avLst>
@@ -26662,7 +26624,7 @@
                   <a:noFill/>
                 </a:ln>
                 <a:solidFill>
-                  <a:prstClr val="white"/>
+                  <a:schemeClr val="tx1"/>
                 </a:solidFill>
                 <a:effectLst/>
                 <a:uLnTx/>
@@ -30309,50 +30271,6 @@
       </p:grpSpPr>
       <p:sp>
         <p:nvSpPr>
-          <p:cNvPr id="2" name="Title 1">
-            <a:extLst>
-              <a:ext uri="{FF2B5EF4-FFF2-40B4-BE49-F238E27FC236}">
-                <a16:creationId xmlns:a16="http://schemas.microsoft.com/office/drawing/2014/main" id="{A21F9BB3-19E8-171D-B527-920B57F51297}"/>
-              </a:ext>
-            </a:extLst>
-          </p:cNvPr>
-          <p:cNvSpPr>
-            <a:spLocks noGrp="1"/>
-          </p:cNvSpPr>
-          <p:nvPr>
-            <p:ph type="title"/>
-          </p:nvPr>
-        </p:nvSpPr>
-        <p:spPr>
-          <a:xfrm>
-            <a:off x="143385" y="132847"/>
-            <a:ext cx="10515600" cy="1325563"/>
-          </a:xfrm>
-        </p:spPr>
-        <p:txBody>
-          <a:bodyPr>
-            <a:normAutofit/>
-          </a:bodyPr>
-          <a:lstStyle/>
-          <a:p>
-            <a:r>
-              <a:rPr lang="en-US" sz="3600" i="1" dirty="0">
-                <a:solidFill>
-                  <a:schemeClr val="bg1"/>
-                </a:solidFill>
-              </a:rPr>
-              <a:t>Resources Involved in Connection</a:t>
-            </a:r>
-            <a:endParaRPr lang="en-GB" sz="3600" dirty="0">
-              <a:solidFill>
-                <a:schemeClr val="bg1"/>
-              </a:solidFill>
-            </a:endParaRPr>
-          </a:p>
-        </p:txBody>
-      </p:sp>
-      <p:sp>
-        <p:nvSpPr>
           <p:cNvPr id="12" name="Oval 11">
             <a:extLst>
               <a:ext uri="{FF2B5EF4-FFF2-40B4-BE49-F238E27FC236}">
@@ -30496,8 +30414,8 @@
         </p:nvSpPr>
         <p:spPr>
           <a:xfrm>
-            <a:off x="1946258" y="3840717"/>
-            <a:ext cx="844510" cy="252421"/>
+            <a:off x="1946257" y="3840717"/>
+            <a:ext cx="896701" cy="252421"/>
           </a:xfrm>
           <a:prstGeom prst="ellipse">
             <a:avLst/>
@@ -30552,22 +30470,28 @@
               <a:defRPr/>
             </a:pPr>
             <a:r>
-              <a:rPr kumimoji="0" lang="en-GB" sz="800" b="0" i="0" u="none" strike="noStrike" kern="1200" cap="none" spc="0" normalizeH="0" baseline="0" noProof="0" dirty="0">
-                <a:ln>
-                  <a:noFill/>
-                </a:ln>
+              <a:rPr lang="en-GB" sz="800" dirty="0">
                 <a:solidFill>
-                  <a:prstClr val="white"/>
+                  <a:schemeClr val="tx1"/>
                 </a:solidFill>
-                <a:effectLst/>
-                <a:uLnTx/>
-                <a:uFillTx/>
                 <a:latin typeface="Calibri" panose="020F0502020204030204"/>
-                <a:ea typeface="+mn-ea"/>
-                <a:cs typeface="+mn-cs"/>
               </a:rPr>
-              <a:t>CPUs</a:t>
+              <a:t>Processors</a:t>
             </a:r>
+            <a:endParaRPr kumimoji="0" lang="en-GB" sz="800" b="0" i="0" u="none" strike="noStrike" kern="1200" cap="none" spc="0" normalizeH="0" baseline="0" noProof="0" dirty="0">
+              <a:ln>
+                <a:noFill/>
+              </a:ln>
+              <a:solidFill>
+                <a:schemeClr val="tx1"/>
+              </a:solidFill>
+              <a:effectLst/>
+              <a:uLnTx/>
+              <a:uFillTx/>
+              <a:latin typeface="Calibri" panose="020F0502020204030204"/>
+              <a:ea typeface="+mn-ea"/>
+              <a:cs typeface="+mn-cs"/>
+            </a:endParaRPr>
           </a:p>
         </p:txBody>
       </p:sp>
@@ -30585,8 +30509,8 @@
         </p:nvSpPr>
         <p:spPr>
           <a:xfrm>
-            <a:off x="2212316" y="4023890"/>
-            <a:ext cx="301537" cy="253500"/>
+            <a:off x="1956524" y="4023890"/>
+            <a:ext cx="557330" cy="253500"/>
           </a:xfrm>
           <a:prstGeom prst="ellipse">
             <a:avLst/>
@@ -30655,7 +30579,7 @@
                 <a:ea typeface="+mn-ea"/>
                 <a:cs typeface="+mn-cs"/>
               </a:rPr>
-              <a:t>1</a:t>
+              <a:t>CPU1</a:t>
             </a:r>
           </a:p>
         </p:txBody>
@@ -30678,8 +30602,8 @@
         </p:nvCxnSpPr>
         <p:spPr>
           <a:xfrm rot="16200000" flipH="1">
-            <a:off x="1899014" y="3371217"/>
-            <a:ext cx="883451" cy="55548"/>
+            <a:off x="1912061" y="3358169"/>
+            <a:ext cx="883451" cy="81643"/>
           </a:xfrm>
           <a:prstGeom prst="curvedConnector3">
             <a:avLst>
@@ -33171,8 +33095,8 @@
         </p:nvCxnSpPr>
         <p:spPr>
           <a:xfrm rot="10800000">
-            <a:off x="2513853" y="4150641"/>
-            <a:ext cx="2203938" cy="143043"/>
+            <a:off x="2513855" y="4150641"/>
+            <a:ext cx="2203937" cy="143043"/>
           </a:xfrm>
           <a:prstGeom prst="curvedConnector3">
             <a:avLst>

</xml_diff>